<commit_message>
carplant carsimmode sprungantwort regelparameter
</commit_message>
<xml_diff>
--- a/Modbas/ModBas.pptx
+++ b/Modbas/ModBas.pptx
@@ -331,7 +331,7 @@
           <a:p>
             <a:fld id="{D338F796-E297-45CA-A62B-51A04DE86EC6}" type="datetimeFigureOut">
               <a:rPr lang="de-DE" smtClean="0"/>
-              <a:t>22.11.2022</a:t>
+              <a:t>23.11.2022</a:t>
             </a:fld>
             <a:endParaRPr lang="de-DE"/>
           </a:p>
@@ -409,7 +409,7 @@
           <a:p>
             <a:fld id="{D7473342-4B16-4649-B223-F22170E43743}" type="slidenum">
               <a:rPr lang="de-DE" smtClean="0"/>
-              <a:t>‹#›</a:t>
+              <a:t>‹Nr.›</a:t>
             </a:fld>
             <a:endParaRPr lang="de-DE"/>
           </a:p>
@@ -508,7 +508,7 @@
           <a:p>
             <a:fld id="{C4F0A1C8-C3E5-453E-B0DF-36BAC2F5290E}" type="datetimeFigureOut">
               <a:rPr lang="de-DE" smtClean="0"/>
-              <a:t>22.11.2022</a:t>
+              <a:t>23.11.2022</a:t>
             </a:fld>
             <a:endParaRPr lang="de-DE" dirty="0"/>
           </a:p>
@@ -666,7 +666,7 @@
           <a:p>
             <a:fld id="{2163F8F1-A50E-4338-81DC-A409571378D0}" type="slidenum">
               <a:rPr lang="de-DE" smtClean="0"/>
-              <a:t>‹#›</a:t>
+              <a:t>‹Nr.›</a:t>
             </a:fld>
             <a:endParaRPr lang="de-DE" dirty="0"/>
           </a:p>
@@ -2540,8 +2540,8 @@
           <a:chExt cx="0" cy="0"/>
         </a:xfrm>
       </p:grpSpPr>
-      <mc:AlternateContent xmlns:mc="http://schemas.openxmlformats.org/markup-compatibility/2006">
-        <mc:Choice xmlns:a14="http://schemas.microsoft.com/office/drawing/2010/main" Requires="a14">
+      <mc:AlternateContent xmlns:mc="http://schemas.openxmlformats.org/markup-compatibility/2006" xmlns:a14="http://schemas.microsoft.com/office/drawing/2010/main">
+        <mc:Choice Requires="a14">
           <p:sp>
             <p:nvSpPr>
               <p:cNvPr id="2" name="Title 1">
@@ -2634,7 +2634,7 @@
             </p:txBody>
           </p:sp>
         </mc:Choice>
-        <mc:Fallback>
+        <mc:Fallback xmlns="">
           <p:sp>
             <p:nvSpPr>
               <p:cNvPr id="2" name="Title 1">
@@ -2674,8 +2674,8 @@
           </p:sp>
         </mc:Fallback>
       </mc:AlternateContent>
-      <mc:AlternateContent xmlns:mc="http://schemas.openxmlformats.org/markup-compatibility/2006">
-        <mc:Choice xmlns:a14="http://schemas.microsoft.com/office/drawing/2010/main" Requires="a14">
+      <mc:AlternateContent xmlns:mc="http://schemas.openxmlformats.org/markup-compatibility/2006" xmlns:a14="http://schemas.microsoft.com/office/drawing/2010/main">
+        <mc:Choice Requires="a14">
           <p:sp>
             <p:nvSpPr>
               <p:cNvPr id="3" name="Content Placeholder 2">
@@ -4773,7 +4773,7 @@
             </p:txBody>
           </p:sp>
         </mc:Choice>
-        <mc:Fallback>
+        <mc:Fallback xmlns="">
           <p:sp>
             <p:nvSpPr>
               <p:cNvPr id="3" name="Content Placeholder 2">
@@ -4813,8 +4813,8 @@
           </p:sp>
         </mc:Fallback>
       </mc:AlternateContent>
-      <mc:AlternateContent xmlns:mc="http://schemas.openxmlformats.org/markup-compatibility/2006">
-        <mc:Choice xmlns:a14="http://schemas.microsoft.com/office/drawing/2010/main" Requires="a14">
+      <mc:AlternateContent xmlns:mc="http://schemas.openxmlformats.org/markup-compatibility/2006" xmlns:a14="http://schemas.microsoft.com/office/drawing/2010/main">
+        <mc:Choice Requires="a14">
           <p:sp>
             <p:nvSpPr>
               <p:cNvPr id="4" name="Content Placeholder 3">
@@ -6399,13 +6399,7 @@
                       <a:rPr lang="de-DE" b="0" i="1" smtClean="0">
                         <a:latin typeface="Cambria Math" panose="02040503050406030204" pitchFamily="18" charset="0"/>
                       </a:rPr>
-                      <m:t>=</m:t>
-                    </m:r>
-                    <m:r>
-                      <a:rPr lang="de-DE" b="0" i="1" smtClean="0">
-                        <a:latin typeface="Cambria Math" panose="02040503050406030204" pitchFamily="18" charset="0"/>
-                      </a:rPr>
-                      <m:t>0,344</m:t>
+                      <m:t>=0,344</m:t>
                     </m:r>
                     <m:f>
                       <m:fPr>
@@ -6439,7 +6433,7 @@
             </p:txBody>
           </p:sp>
         </mc:Choice>
-        <mc:Fallback>
+        <mc:Fallback xmlns="">
           <p:sp>
             <p:nvSpPr>
               <p:cNvPr id="4" name="Content Placeholder 3">
@@ -8267,7 +8261,7 @@
                           <a:rPr lang="de-DE" b="0" i="1" smtClean="0">
                             <a:latin typeface="Cambria Math" panose="02040503050406030204" pitchFamily="18" charset="0"/>
                           </a:rPr>
-                          <m:t>𝑖𝑘</m:t>
+                          <m:t>𝑘</m:t>
                         </m:r>
                       </m:sub>
                     </m:sSub>
@@ -8452,12 +8446,6 @@
                         </m:r>
                       </m:e>
                       <m:sub>
-                        <m:r>
-                          <a:rPr lang="de-DE" b="0" i="1" smtClean="0">
-                            <a:latin typeface="Cambria Math" panose="02040503050406030204" pitchFamily="18" charset="0"/>
-                          </a:rPr>
-                          <m:t>𝑖</m:t>
-                        </m:r>
                         <m:r>
                           <a:rPr lang="de-DE" b="0" i="1" smtClean="0">
                             <a:latin typeface="Cambria Math" panose="02040503050406030204" pitchFamily="18" charset="0"/>
@@ -8668,13 +8656,7 @@
                           <a:rPr lang="de-DE" b="0" i="1" smtClean="0">
                             <a:latin typeface="Cambria Math" panose="02040503050406030204" pitchFamily="18" charset="0"/>
                           </a:rPr>
-                          <m:t>𝑝</m:t>
-                        </m:r>
-                        <m:r>
-                          <a:rPr lang="de-DE" b="0" i="1" smtClean="0">
-                            <a:latin typeface="Cambria Math" panose="02040503050406030204" pitchFamily="18" charset="0"/>
-                          </a:rPr>
-                          <m:t>𝑅</m:t>
+                          <m:t>𝑝𝑅</m:t>
                         </m:r>
                       </m:sub>
                     </m:sSub>
@@ -9073,7 +9055,7 @@
                           <a:rPr lang="de-DE" b="0" i="1" smtClean="0">
                             <a:latin typeface="Cambria Math" panose="02040503050406030204" pitchFamily="18" charset="0"/>
                           </a:rPr>
-                          <m:t>𝑝𝑘</m:t>
+                          <m:t>𝑘</m:t>
                         </m:r>
                       </m:sub>
                     </m:sSub>

</xml_diff>

<commit_message>
verteilte systeme und modbas
</commit_message>
<xml_diff>
--- a/Modbas/ModBas.pptx
+++ b/Modbas/ModBas.pptx
@@ -161,82 +161,6 @@
 </p1510:revInfo>
 </file>
 
-<file path=ppt/changesInfos/changesInfo1.xml><?xml version="1.0" encoding="utf-8"?>
-<pc:chgInfo xmlns:a="http://schemas.openxmlformats.org/drawingml/2006/main" xmlns:r="http://schemas.openxmlformats.org/officeDocument/2006/relationships" xmlns:ac="http://schemas.microsoft.com/office/drawing/2013/main/command" xmlns:pc="http://schemas.microsoft.com/office/powerpoint/2013/main/command">
-  <pc:docChgLst>
-    <pc:chgData name="Mattis Ritter" userId="ecb87eda-52c8-48cc-b7df-1413e88e2027" providerId="ADAL" clId="{4779A709-8702-4447-A370-900A0D198550}"/>
-    <pc:docChg chg="custSel addSld modSld">
-      <pc:chgData name="Mattis Ritter" userId="ecb87eda-52c8-48cc-b7df-1413e88e2027" providerId="ADAL" clId="{4779A709-8702-4447-A370-900A0D198550}" dt="2022-11-22T10:21:41.044" v="1081" actId="20577"/>
-      <pc:docMkLst>
-        <pc:docMk/>
-      </pc:docMkLst>
-      <pc:sldChg chg="modSp mod">
-        <pc:chgData name="Mattis Ritter" userId="ecb87eda-52c8-48cc-b7df-1413e88e2027" providerId="ADAL" clId="{4779A709-8702-4447-A370-900A0D198550}" dt="2022-11-22T09:28:53.221" v="428" actId="20577"/>
-        <pc:sldMkLst>
-          <pc:docMk/>
-          <pc:sldMk cId="3596432278" sldId="257"/>
-        </pc:sldMkLst>
-        <pc:spChg chg="mod">
-          <ac:chgData name="Mattis Ritter" userId="ecb87eda-52c8-48cc-b7df-1413e88e2027" providerId="ADAL" clId="{4779A709-8702-4447-A370-900A0D198550}" dt="2022-11-22T09:28:42.003" v="426" actId="20577"/>
-          <ac:spMkLst>
-            <pc:docMk/>
-            <pc:sldMk cId="3596432278" sldId="257"/>
-            <ac:spMk id="2" creationId="{F864A8C9-4CB7-382C-6709-3827D123B270}"/>
-          </ac:spMkLst>
-        </pc:spChg>
-        <pc:spChg chg="mod">
-          <ac:chgData name="Mattis Ritter" userId="ecb87eda-52c8-48cc-b7df-1413e88e2027" providerId="ADAL" clId="{4779A709-8702-4447-A370-900A0D198550}" dt="2022-11-22T09:12:50.533" v="186" actId="27636"/>
-          <ac:spMkLst>
-            <pc:docMk/>
-            <pc:sldMk cId="3596432278" sldId="257"/>
-            <ac:spMk id="3" creationId="{279F7088-2F01-0514-D047-51E5F6881338}"/>
-          </ac:spMkLst>
-        </pc:spChg>
-        <pc:spChg chg="mod">
-          <ac:chgData name="Mattis Ritter" userId="ecb87eda-52c8-48cc-b7df-1413e88e2027" providerId="ADAL" clId="{4779A709-8702-4447-A370-900A0D198550}" dt="2022-11-22T09:28:53.221" v="428" actId="20577"/>
-          <ac:spMkLst>
-            <pc:docMk/>
-            <pc:sldMk cId="3596432278" sldId="257"/>
-            <ac:spMk id="4" creationId="{A4ED7F65-7674-A343-C703-DEDEC5FC19CE}"/>
-          </ac:spMkLst>
-        </pc:spChg>
-      </pc:sldChg>
-      <pc:sldChg chg="modSp new mod">
-        <pc:chgData name="Mattis Ritter" userId="ecb87eda-52c8-48cc-b7df-1413e88e2027" providerId="ADAL" clId="{4779A709-8702-4447-A370-900A0D198550}" dt="2022-11-22T10:21:41.044" v="1081" actId="20577"/>
-        <pc:sldMkLst>
-          <pc:docMk/>
-          <pc:sldMk cId="2156184454" sldId="258"/>
-        </pc:sldMkLst>
-        <pc:spChg chg="mod">
-          <ac:chgData name="Mattis Ritter" userId="ecb87eda-52c8-48cc-b7df-1413e88e2027" providerId="ADAL" clId="{4779A709-8702-4447-A370-900A0D198550}" dt="2022-11-22T09:29:16.895" v="464" actId="20577"/>
-          <ac:spMkLst>
-            <pc:docMk/>
-            <pc:sldMk cId="2156184454" sldId="258"/>
-            <ac:spMk id="2" creationId="{A64B45CC-DBB6-4D18-A780-4E3B4A9F472A}"/>
-          </ac:spMkLst>
-        </pc:spChg>
-        <pc:spChg chg="mod">
-          <ac:chgData name="Mattis Ritter" userId="ecb87eda-52c8-48cc-b7df-1413e88e2027" providerId="ADAL" clId="{4779A709-8702-4447-A370-900A0D198550}" dt="2022-11-22T10:13:50.086" v="986" actId="20577"/>
-          <ac:spMkLst>
-            <pc:docMk/>
-            <pc:sldMk cId="2156184454" sldId="258"/>
-            <ac:spMk id="3" creationId="{C1E7C977-669F-D1D7-858F-060FF82301E0}"/>
-          </ac:spMkLst>
-        </pc:spChg>
-        <pc:spChg chg="mod">
-          <ac:chgData name="Mattis Ritter" userId="ecb87eda-52c8-48cc-b7df-1413e88e2027" providerId="ADAL" clId="{4779A709-8702-4447-A370-900A0D198550}" dt="2022-11-22T10:21:41.044" v="1081" actId="20577"/>
-          <ac:spMkLst>
-            <pc:docMk/>
-            <pc:sldMk cId="2156184454" sldId="258"/>
-            <ac:spMk id="4" creationId="{D8BA6C42-99CB-8034-1924-4B8EF6D05E8C}"/>
-          </ac:spMkLst>
-        </pc:spChg>
-      </pc:sldChg>
-    </pc:docChg>
-  </pc:docChgLst>
-</pc:chgInfo>
-</file>
-
 <file path=ppt/handoutMasters/handoutMaster1.xml><?xml version="1.0" encoding="utf-8"?>
 <p:handoutMaster xmlns:a="http://schemas.openxmlformats.org/drawingml/2006/main" xmlns:r="http://schemas.openxmlformats.org/officeDocument/2006/relationships" xmlns:p="http://schemas.openxmlformats.org/presentationml/2006/main">
   <p:cSld>
@@ -331,7 +255,7 @@
           <a:p>
             <a:fld id="{D338F796-E297-45CA-A62B-51A04DE86EC6}" type="datetimeFigureOut">
               <a:rPr lang="de-DE" smtClean="0"/>
-              <a:t>28.11.2022</a:t>
+              <a:t>29.11.2022</a:t>
             </a:fld>
             <a:endParaRPr lang="de-DE"/>
           </a:p>
@@ -508,7 +432,7 @@
           <a:p>
             <a:fld id="{C4F0A1C8-C3E5-453E-B0DF-36BAC2F5290E}" type="datetimeFigureOut">
               <a:rPr lang="de-DE" smtClean="0"/>
-              <a:t>28.11.2022</a:t>
+              <a:t>29.11.2022</a:t>
             </a:fld>
             <a:endParaRPr lang="de-DE" dirty="0"/>
           </a:p>
@@ -2674,8 +2598,8 @@
           </p:sp>
         </mc:Fallback>
       </mc:AlternateContent>
-      <mc:AlternateContent xmlns:mc="http://schemas.openxmlformats.org/markup-compatibility/2006" xmlns:a14="http://schemas.microsoft.com/office/drawing/2010/main">
-        <mc:Choice Requires="a14">
+      <mc:AlternateContent xmlns:mc="http://schemas.openxmlformats.org/markup-compatibility/2006">
+        <mc:Choice xmlns:a14="http://schemas.microsoft.com/office/drawing/2010/main" Requires="a14">
           <p:sp>
             <p:nvSpPr>
               <p:cNvPr id="3" name="Content Placeholder 2">
@@ -4494,7 +4418,7 @@
                 <a:pPr lvl="1"/>
                 <a:r>
                   <a:rPr lang="en-US" sz="1800" dirty="0" err="1"/>
-                  <a:t>Überschwingweit</a:t>
+                  <a:t>Überschwingweite</a:t>
                 </a:r>
                 <a:r>
                   <a:rPr lang="en-US" sz="1800" dirty="0"/>
@@ -4773,7 +4697,7 @@
             </p:txBody>
           </p:sp>
         </mc:Choice>
-        <mc:Fallback xmlns="">
+        <mc:Fallback>
           <p:sp>
             <p:nvSpPr>
               <p:cNvPr id="3" name="Content Placeholder 2">
@@ -8946,8 +8870,8 @@
           </p:sp>
         </mc:Fallback>
       </mc:AlternateContent>
-      <mc:AlternateContent xmlns:mc="http://schemas.openxmlformats.org/markup-compatibility/2006">
-        <mc:Choice xmlns:a14="http://schemas.microsoft.com/office/drawing/2010/main" Requires="a14">
+      <mc:AlternateContent xmlns:mc="http://schemas.openxmlformats.org/markup-compatibility/2006" xmlns:a14="http://schemas.microsoft.com/office/drawing/2010/main">
+        <mc:Choice Requires="a14">
           <p:sp>
             <p:nvSpPr>
               <p:cNvPr id="4" name="Content Placeholder 3">
@@ -9074,7 +8998,26 @@
                   <a:rPr lang="en-US" dirty="0" err="1"/>
                   <a:t>Zusammengeführt</a:t>
                 </a:r>
-                <a:endParaRPr lang="en-US" dirty="0"/>
+                <a:r>
+                  <a:rPr lang="en-US" dirty="0"/>
+                  <a:t> (</a:t>
+                </a:r>
+                <a:r>
+                  <a:rPr lang="en-US" dirty="0" err="1"/>
+                  <a:t>nicht</a:t>
+                </a:r>
+                <a:r>
+                  <a:rPr lang="en-US" dirty="0"/>
+                  <a:t> </a:t>
+                </a:r>
+                <a:r>
+                  <a:rPr lang="en-US" dirty="0" err="1"/>
+                  <a:t>benötigt</a:t>
+                </a:r>
+                <a:r>
+                  <a:rPr lang="en-US" dirty="0"/>
+                  <a:t>)</a:t>
+                </a:r>
               </a:p>
               <a:p>
                 <a:pPr lvl="1"/>
@@ -9132,7 +9075,7 @@
                           <a:rPr lang="de-DE" b="0" i="1" smtClean="0">
                             <a:latin typeface="Cambria Math" panose="02040503050406030204" pitchFamily="18" charset="0"/>
                           </a:rPr>
-                          <m:t>𝑘</m:t>
+                          <m:t>𝑖𝑘</m:t>
                         </m:r>
                         <m:r>
                           <a:rPr lang="de-DE" b="0" i="1" smtClean="0">
@@ -9285,7 +9228,7 @@
             </p:txBody>
           </p:sp>
         </mc:Choice>
-        <mc:Fallback>
+        <mc:Fallback xmlns="">
           <p:sp>
             <p:nvSpPr>
               <p:cNvPr id="4" name="Content Placeholder 3">

</xml_diff>